<commit_message>
Credit card bill payment
</commit_message>
<xml_diff>
--- a/FinalPresentation.pptx
+++ b/FinalPresentation.pptx
@@ -6414,6 +6414,44 @@
           </a:prstGeom>
         </p:spPr>
       </p:pic>
+      <p:sp>
+        <p:nvSpPr>
+          <p:cNvPr id="3" name="TextBox 2">
+            <a:extLst>
+              <a:ext uri="{FF2B5EF4-FFF2-40B4-BE49-F238E27FC236}">
+                <a16:creationId xmlns:a16="http://schemas.microsoft.com/office/drawing/2014/main" id="{139164E1-A441-48CC-A2DF-6FBCBAB51AD6}"/>
+              </a:ext>
+            </a:extLst>
+          </p:cNvPr>
+          <p:cNvSpPr txBox="1"/>
+          <p:nvPr/>
+        </p:nvSpPr>
+        <p:spPr>
+          <a:xfrm>
+            <a:off x="838200" y="566241"/>
+            <a:ext cx="3860800" cy="461665"/>
+          </a:xfrm>
+          <a:prstGeom prst="rect">
+            <a:avLst/>
+          </a:prstGeom>
+          <a:noFill/>
+        </p:spPr>
+        <p:txBody>
+          <a:bodyPr wrap="square" rtlCol="0">
+            <a:spAutoFit/>
+          </a:bodyPr>
+          <a:lstStyle/>
+          <a:p>
+            <a:r>
+              <a:rPr lang="en-IN" sz="2400" dirty="0">
+                <a:latin typeface="Times New Roman" panose="02020603050405020304" pitchFamily="18" charset="0"/>
+                <a:cs typeface="Times New Roman" panose="02020603050405020304" pitchFamily="18" charset="0"/>
+              </a:rPr>
+              <a:t>Overview</a:t>
+            </a:r>
+          </a:p>
+        </p:txBody>
+      </p:sp>
     </p:spTree>
     <p:extLst>
       <p:ext uri="{BB962C8B-B14F-4D97-AF65-F5344CB8AC3E}">
@@ -7003,10 +7041,10 @@
       </p:sp>
       <p:pic>
         <p:nvPicPr>
-          <p:cNvPr id="3" name="Picture 2">
-            <a:extLst>
-              <a:ext uri="{FF2B5EF4-FFF2-40B4-BE49-F238E27FC236}">
-                <a16:creationId xmlns:a16="http://schemas.microsoft.com/office/drawing/2014/main" id="{C4C70ECB-2BDD-4948-A9AD-34CC74DBAB5C}"/>
+          <p:cNvPr id="4" name="Picture 3">
+            <a:extLst>
+              <a:ext uri="{FF2B5EF4-FFF2-40B4-BE49-F238E27FC236}">
+                <a16:creationId xmlns:a16="http://schemas.microsoft.com/office/drawing/2014/main" id="{FF6A0C68-39E0-408D-9F65-CAC25B16B73B}"/>
               </a:ext>
             </a:extLst>
           </p:cNvPr>
@@ -7047,6 +7085,44 @@
           </a:effectLst>
         </p:spPr>
       </p:pic>
+      <p:sp>
+        <p:nvSpPr>
+          <p:cNvPr id="12" name="TextBox 11">
+            <a:extLst>
+              <a:ext uri="{FF2B5EF4-FFF2-40B4-BE49-F238E27FC236}">
+                <a16:creationId xmlns:a16="http://schemas.microsoft.com/office/drawing/2014/main" id="{677A087A-864D-4AB8-AAE2-0993F7CD2BC9}"/>
+              </a:ext>
+            </a:extLst>
+          </p:cNvPr>
+          <p:cNvSpPr txBox="1"/>
+          <p:nvPr/>
+        </p:nvSpPr>
+        <p:spPr>
+          <a:xfrm>
+            <a:off x="5105400" y="2764906"/>
+            <a:ext cx="3860800" cy="461665"/>
+          </a:xfrm>
+          <a:prstGeom prst="rect">
+            <a:avLst/>
+          </a:prstGeom>
+          <a:noFill/>
+        </p:spPr>
+        <p:txBody>
+          <a:bodyPr wrap="square" rtlCol="0">
+            <a:spAutoFit/>
+          </a:bodyPr>
+          <a:lstStyle/>
+          <a:p>
+            <a:r>
+              <a:rPr lang="en-IN" sz="2400" dirty="0">
+                <a:latin typeface="Times New Roman" panose="02020603050405020304" pitchFamily="18" charset="0"/>
+                <a:cs typeface="Times New Roman" panose="02020603050405020304" pitchFamily="18" charset="0"/>
+              </a:rPr>
+              <a:t>Class Diagram</a:t>
+            </a:r>
+          </a:p>
+        </p:txBody>
+      </p:sp>
     </p:spTree>
     <p:extLst>
       <p:ext uri="{BB962C8B-B14F-4D97-AF65-F5344CB8AC3E}">

</xml_diff>